<commit_message>
save new tests and fixes
</commit_message>
<xml_diff>
--- a/Packs/CommonScripts/Scripts/ExtractHyperlinksFromOfficeFiles/test_data/p1.pptx
+++ b/Packs/CommonScripts/Scripts/ExtractHyperlinksFromOfficeFiles/test_data/p1.pptx
@@ -5469,8 +5469,8 @@
         </p:blipFill>
         <p:spPr>
           <a:xfrm>
-            <a:off x="1152750" y="1285875"/>
-            <a:ext cx="3543300" cy="1285875"/>
+            <a:off x="510850" y="769275"/>
+            <a:ext cx="1819275" cy="1428750"/>
           </a:xfrm>
           <a:prstGeom prst="rect">
             <a:avLst/>
@@ -5481,26 +5481,16 @@
           </a:ln>
         </p:spPr>
       </p:pic>
-      <p:pic>
-        <p:nvPicPr>
-          <p:cNvPr id="55" name="Google Shape;55;p13">
-            <a:hlinkClick r:id="rId5"/>
-          </p:cNvPr>
-          <p:cNvPicPr preferRelativeResize="0"/>
+      <p:sp>
+        <p:nvSpPr>
+          <p:cNvPr id="55" name="Google Shape;55;p13"/>
+          <p:cNvSpPr txBox="1"/>
           <p:nvPr/>
-        </p:nvPicPr>
-        <p:blipFill>
-          <a:blip r:embed="rId6">
-            <a:alphaModFix/>
-          </a:blip>
-          <a:stretch>
-            <a:fillRect/>
-          </a:stretch>
-        </p:blipFill>
+        </p:nvSpPr>
         <p:spPr>
           <a:xfrm>
-            <a:off x="4823450" y="1238250"/>
-            <a:ext cx="2667000" cy="2667000"/>
+            <a:off x="3692975" y="1967375"/>
+            <a:ext cx="3000000" cy="1046700"/>
           </a:xfrm>
           <a:prstGeom prst="rect">
             <a:avLst/>
@@ -5510,7 +5500,79 @@
             <a:noFill/>
           </a:ln>
         </p:spPr>
-      </p:pic>
+        <p:txBody>
+          <a:bodyPr anchorCtr="0" anchor="t" bIns="91425" lIns="91425" spcFirstLastPara="1" rIns="91425" wrap="square" tIns="91425">
+            <a:spAutoFit/>
+          </a:bodyPr>
+          <a:lstStyle/>
+          <a:p>
+            <a:pPr indent="0" lvl="0" marL="0" rtl="0" algn="l">
+              <a:spcBef>
+                <a:spcPts val="0"/>
+              </a:spcBef>
+              <a:spcAft>
+                <a:spcPts val="0"/>
+              </a:spcAft>
+              <a:buNone/>
+            </a:pPr>
+            <a:r>
+              <a:rPr lang="en" u="sng">
+                <a:solidFill>
+                  <a:schemeClr val="hlink"/>
+                </a:solidFill>
+                <a:hlinkClick r:id="rId5"/>
+              </a:rPr>
+              <a:t>https://www.paloaltonetworks.com/</a:t>
+            </a:r>
+            <a:endParaRPr/>
+          </a:p>
+          <a:p>
+            <a:pPr indent="0" lvl="0" marL="0" rtl="0" algn="l">
+              <a:spcBef>
+                <a:spcPts val="0"/>
+              </a:spcBef>
+              <a:spcAft>
+                <a:spcPts val="0"/>
+              </a:spcAft>
+              <a:buNone/>
+            </a:pPr>
+            <a:r>
+              <a:t/>
+            </a:r>
+            <a:endParaRPr/>
+          </a:p>
+          <a:p>
+            <a:pPr indent="0" lvl="0" marL="0" rtl="0" algn="l">
+              <a:spcBef>
+                <a:spcPts val="0"/>
+              </a:spcBef>
+              <a:spcAft>
+                <a:spcPts val="0"/>
+              </a:spcAft>
+              <a:buNone/>
+            </a:pPr>
+            <a:r>
+              <a:t/>
+            </a:r>
+            <a:endParaRPr/>
+          </a:p>
+          <a:p>
+            <a:pPr indent="0" lvl="0" marL="0" rtl="0" algn="l">
+              <a:spcBef>
+                <a:spcPts val="0"/>
+              </a:spcBef>
+              <a:spcAft>
+                <a:spcPts val="0"/>
+              </a:spcAft>
+              <a:buNone/>
+            </a:pPr>
+            <a:r>
+              <a:t/>
+            </a:r>
+            <a:endParaRPr/>
+          </a:p>
+        </p:txBody>
+      </p:sp>
     </p:spTree>
   </p:cSld>
   <p:clrMapOvr>

</xml_diff>